<commit_message>
CurrentDraw: Tweak Table Headings
</commit_message>
<xml_diff>
--- a/2016-11-23 Teensy 3.6 Current Draw/Figures.pptx
+++ b/2016-11-23 Teensy 3.6 Current Draw/Figures.pptx
@@ -8031,7 +8031,7 @@
           <p:nvPr>
             <p:extLst>
               <p:ext uri="{D42A27DB-BD31-4B8C-83A1-F6EECF244321}">
-                <p14:modId xmlns:p14="http://schemas.microsoft.com/office/powerpoint/2010/main" val="2852787025"/>
+                <p14:modId xmlns:p14="http://schemas.microsoft.com/office/powerpoint/2010/main" val="2659054629"/>
               </p:ext>
             </p:extLst>
           </p:nvPr>
@@ -8117,14 +8117,44 @@
                     <a:p>
                       <a:pPr algn="ctr" fontAlgn="b"/>
                       <a:r>
-                        <a:rPr lang="en-US" sz="1200" b="1" i="0" u="none" strike="noStrike">
+                        <a:rPr lang="en-US" sz="1200" b="1" i="0" u="none" strike="noStrike" dirty="0">
                           <a:solidFill>
                             <a:srgbClr val="000000"/>
                           </a:solidFill>
                           <a:effectLst/>
                           <a:latin typeface="Arial"/>
                         </a:rPr>
-                        <a:t>Estimated Battery Life</a:t>
+                        <a:t>Estimated Battery </a:t>
+                      </a:r>
+                      <a:r>
+                        <a:rPr lang="en-US" sz="1200" b="1" i="0" u="none" strike="noStrike" dirty="0" smtClean="0">
+                          <a:solidFill>
+                            <a:srgbClr val="000000"/>
+                          </a:solidFill>
+                          <a:effectLst/>
+                          <a:latin typeface="Arial"/>
+                        </a:rPr>
+                        <a:t>Life (</a:t>
+                      </a:r>
+                      <a:r>
+                        <a:rPr lang="en-US" sz="1200" b="1" i="0" u="none" strike="noStrike" dirty="0" err="1" smtClean="0">
+                          <a:solidFill>
+                            <a:srgbClr val="000000"/>
+                          </a:solidFill>
+                          <a:effectLst/>
+                          <a:latin typeface="Arial"/>
+                        </a:rPr>
+                        <a:t>Hrs</a:t>
+                      </a:r>
+                      <a:r>
+                        <a:rPr lang="en-US" sz="1200" b="1" i="0" u="none" strike="noStrike" dirty="0" smtClean="0">
+                          <a:solidFill>
+                            <a:srgbClr val="000000"/>
+                          </a:solidFill>
+                          <a:effectLst/>
+                          <a:latin typeface="Arial"/>
+                        </a:rPr>
+                        <a:t>)</a:t>
                       </a:r>
                     </a:p>
                   </a:txBody>

</xml_diff>